<commit_message>
One last change to powerpoint
</commit_message>
<xml_diff>
--- a/Beginners Track Challenge.pptx
+++ b/Beginners Track Challenge.pptx
@@ -719,10 +719,10 @@
               <a:buNone/>
             </a:pPr>
             <a:r>
-              <a:rPr lang="en"/>
+              <a:rPr lang="en" dirty="0"/>
               <a:t>Michael</a:t>
             </a:r>
-            <a:endParaRPr/>
+            <a:endParaRPr dirty="0"/>
           </a:p>
         </p:txBody>
       </p:sp>
@@ -11787,8 +11787,8 @@
         </p:nvSpPr>
         <p:spPr>
           <a:xfrm>
-            <a:off x="866500" y="1518163"/>
-            <a:ext cx="4255500" cy="1872900"/>
+            <a:off x="866499" y="1518163"/>
+            <a:ext cx="6258919" cy="1872900"/>
           </a:xfrm>
           <a:prstGeom prst="rect">
             <a:avLst/>
@@ -11796,7 +11796,7 @@
         </p:spPr>
         <p:txBody>
           <a:bodyPr spcFirstLastPara="1" wrap="square" lIns="91425" tIns="91425" rIns="91425" bIns="91425" anchor="ctr" anchorCtr="0">
-            <a:normAutofit/>
+            <a:normAutofit fontScale="90000"/>
           </a:bodyPr>
           <a:lstStyle/>
           <a:p>
@@ -11811,7 +11811,15 @@
             </a:pPr>
             <a:r>
               <a:rPr lang="en" b="1" dirty="0"/>
-              <a:t>Beginners Track Challenge</a:t>
+              <a:t>Rice </a:t>
+            </a:r>
+            <a:r>
+              <a:rPr lang="en" b="1" dirty="0" err="1"/>
+              <a:t>Datathon</a:t>
+            </a:r>
+            <a:r>
+              <a:rPr lang="en" b="1" dirty="0"/>
+              <a:t> 2023: Beginners Track Challenge</a:t>
             </a:r>
             <a:endParaRPr b="1" dirty="0"/>
           </a:p>

</xml_diff>